<commit_message>
G2 pictures added to the poster
</commit_message>
<xml_diff>
--- a/Poster/Poster_Presentation_v1.pptx
+++ b/Poster/Poster_Presentation_v1.pptx
@@ -4941,36 +4941,6 @@
       </p:grpSp>
       <p:pic>
         <p:nvPicPr>
-          <p:cNvPr id="68" name="Picture 67">
-            <a:extLst>
-              <a:ext uri="{FF2B5EF4-FFF2-40B4-BE49-F238E27FC236}">
-                <a16:creationId xmlns:a16="http://schemas.microsoft.com/office/drawing/2014/main" id="{D336AB30-6E4C-4B23-AE14-8CBF49CBAB40}"/>
-              </a:ext>
-            </a:extLst>
-          </p:cNvPr>
-          <p:cNvPicPr>
-            <a:picLocks noChangeAspect="1"/>
-          </p:cNvPicPr>
-          <p:nvPr/>
-        </p:nvPicPr>
-        <p:blipFill>
-          <a:blip r:embed="rId7"/>
-          <a:stretch>
-            <a:fillRect/>
-          </a:stretch>
-        </p:blipFill>
-        <p:spPr>
-          <a:xfrm>
-            <a:off x="9004129" y="3282596"/>
-            <a:ext cx="2246714" cy="977189"/>
-          </a:xfrm>
-          <a:prstGeom prst="rect">
-            <a:avLst/>
-          </a:prstGeom>
-        </p:spPr>
-      </p:pic>
-      <p:pic>
-        <p:nvPicPr>
           <p:cNvPr id="15" name="Picture 14">
             <a:extLst>
               <a:ext uri="{FF2B5EF4-FFF2-40B4-BE49-F238E27FC236}">
@@ -4984,7 +4954,7 @@
           <p:nvPr/>
         </p:nvPicPr>
         <p:blipFill>
-          <a:blip r:embed="rId8">
+          <a:blip r:embed="rId7">
             <a:extLst>
               <a:ext uri="{28A0092B-C50C-407E-A947-70E740481C1C}">
                 <a14:useLocalDpi xmlns:a14="http://schemas.microsoft.com/office/drawing/2010/main" val="0"/>
@@ -5207,15 +5177,87 @@
           <p:nvPr/>
         </p:nvPicPr>
         <p:blipFill>
-          <a:blip r:embed="rId7"/>
+          <a:blip r:embed="rId8"/>
           <a:stretch>
             <a:fillRect/>
           </a:stretch>
         </p:blipFill>
         <p:spPr>
           <a:xfrm>
-            <a:off x="9004129" y="4313257"/>
+            <a:off x="8937577" y="2246155"/>
             <a:ext cx="2246714" cy="977189"/>
+          </a:xfrm>
+          <a:prstGeom prst="rect">
+            <a:avLst/>
+          </a:prstGeom>
+        </p:spPr>
+      </p:pic>
+      <p:pic>
+        <p:nvPicPr>
+          <p:cNvPr id="4" name="Picture 3" descr="A screenshot of a social media post of a person&#10;&#10;Description automatically generated">
+            <a:extLst>
+              <a:ext uri="{FF2B5EF4-FFF2-40B4-BE49-F238E27FC236}">
+                <a16:creationId xmlns:a16="http://schemas.microsoft.com/office/drawing/2014/main" id="{E2800E03-CAB2-4223-8BA0-12E6C6280C55}"/>
+              </a:ext>
+            </a:extLst>
+          </p:cNvPr>
+          <p:cNvPicPr>
+            <a:picLocks noChangeAspect="1"/>
+          </p:cNvPicPr>
+          <p:nvPr/>
+        </p:nvPicPr>
+        <p:blipFill>
+          <a:blip r:embed="rId9">
+            <a:extLst>
+              <a:ext uri="{28A0092B-C50C-407E-A947-70E740481C1C}">
+                <a14:useLocalDpi xmlns:a14="http://schemas.microsoft.com/office/drawing/2010/main" val="0"/>
+              </a:ext>
+            </a:extLst>
+          </a:blip>
+          <a:stretch>
+            <a:fillRect/>
+          </a:stretch>
+        </p:blipFill>
+        <p:spPr>
+          <a:xfrm>
+            <a:off x="8440340" y="4586341"/>
+            <a:ext cx="1620594" cy="1058787"/>
+          </a:xfrm>
+          <a:prstGeom prst="rect">
+            <a:avLst/>
+          </a:prstGeom>
+        </p:spPr>
+      </p:pic>
+      <p:pic>
+        <p:nvPicPr>
+          <p:cNvPr id="6" name="Picture 5" descr="A screen shot of a person&#10;&#10;Description automatically generated">
+            <a:extLst>
+              <a:ext uri="{FF2B5EF4-FFF2-40B4-BE49-F238E27FC236}">
+                <a16:creationId xmlns:a16="http://schemas.microsoft.com/office/drawing/2014/main" id="{F5B8FC64-B34F-4FCB-8050-CA725B988780}"/>
+              </a:ext>
+            </a:extLst>
+          </p:cNvPr>
+          <p:cNvPicPr>
+            <a:picLocks noChangeAspect="1"/>
+          </p:cNvPicPr>
+          <p:nvPr/>
+        </p:nvPicPr>
+        <p:blipFill>
+          <a:blip r:embed="rId10">
+            <a:extLst>
+              <a:ext uri="{28A0092B-C50C-407E-A947-70E740481C1C}">
+                <a14:useLocalDpi xmlns:a14="http://schemas.microsoft.com/office/drawing/2010/main" val="0"/>
+              </a:ext>
+            </a:extLst>
+          </a:blip>
+          <a:stretch>
+            <a:fillRect/>
+          </a:stretch>
+        </p:blipFill>
+        <p:spPr>
+          <a:xfrm>
+            <a:off x="10388646" y="4586341"/>
+            <a:ext cx="1620594" cy="1058787"/>
           </a:xfrm>
           <a:prstGeom prst="rect">
             <a:avLst/>

</xml_diff>

<commit_message>
Deleting a useless slide
</commit_message>
<xml_diff>
--- a/Poster/Poster_Presentation_v1.pptx
+++ b/Poster/Poster_Presentation_v1.pptx
@@ -5,11 +5,10 @@
     <p:sldMasterId id="2147483660" r:id="rId1"/>
   </p:sldMasterIdLst>
   <p:notesMasterIdLst>
-    <p:notesMasterId r:id="rId4"/>
+    <p:notesMasterId r:id="rId3"/>
   </p:notesMasterIdLst>
   <p:sldIdLst>
     <p:sldId id="270" r:id="rId2"/>
-    <p:sldId id="271" r:id="rId3"/>
   </p:sldIdLst>
   <p:sldSz cx="12192000" cy="6858000"/>
   <p:notesSz cx="6858000" cy="9144000"/>
@@ -5277,146 +5276,6 @@
 </p:sld>
 </file>
 
-<file path=ppt/slides/slide2.xml><?xml version="1.0" encoding="utf-8"?>
-<p:sld xmlns:a="http://schemas.openxmlformats.org/drawingml/2006/main" xmlns:r="http://schemas.openxmlformats.org/officeDocument/2006/relationships" xmlns:p="http://schemas.openxmlformats.org/presentationml/2006/main">
-  <p:cSld>
-    <p:spTree>
-      <p:nvGrpSpPr>
-        <p:cNvPr id="1" name=""/>
-        <p:cNvGrpSpPr/>
-        <p:nvPr/>
-      </p:nvGrpSpPr>
-      <p:grpSpPr>
-        <a:xfrm>
-          <a:off x="0" y="0"/>
-          <a:ext cx="0" cy="0"/>
-          <a:chOff x="0" y="0"/>
-          <a:chExt cx="0" cy="0"/>
-        </a:xfrm>
-      </p:grpSpPr>
-      <p:sp>
-        <p:nvSpPr>
-          <p:cNvPr id="2" name="Title 1">
-            <a:extLst>
-              <a:ext uri="{FF2B5EF4-FFF2-40B4-BE49-F238E27FC236}">
-                <a16:creationId xmlns:a16="http://schemas.microsoft.com/office/drawing/2014/main" id="{742DAE71-E667-44CC-8C7A-36FDD58EBD66}"/>
-              </a:ext>
-            </a:extLst>
-          </p:cNvPr>
-          <p:cNvSpPr>
-            <a:spLocks noGrp="1"/>
-          </p:cNvSpPr>
-          <p:nvPr>
-            <p:ph type="title"/>
-          </p:nvPr>
-        </p:nvSpPr>
-        <p:spPr/>
-        <p:txBody>
-          <a:bodyPr/>
-          <a:lstStyle/>
-          <a:p>
-            <a:endParaRPr lang="en-US"/>
-          </a:p>
-        </p:txBody>
-      </p:sp>
-      <p:sp>
-        <p:nvSpPr>
-          <p:cNvPr id="3" name="Content Placeholder 2">
-            <a:extLst>
-              <a:ext uri="{FF2B5EF4-FFF2-40B4-BE49-F238E27FC236}">
-                <a16:creationId xmlns:a16="http://schemas.microsoft.com/office/drawing/2014/main" id="{BCA1A273-E511-4217-9138-8594AC711E75}"/>
-              </a:ext>
-            </a:extLst>
-          </p:cNvPr>
-          <p:cNvSpPr>
-            <a:spLocks noGrp="1"/>
-          </p:cNvSpPr>
-          <p:nvPr>
-            <p:ph idx="1"/>
-          </p:nvPr>
-        </p:nvSpPr>
-        <p:spPr/>
-        <p:txBody>
-          <a:bodyPr/>
-          <a:lstStyle/>
-          <a:p>
-            <a:endParaRPr lang="en-US" dirty="0"/>
-          </a:p>
-        </p:txBody>
-      </p:sp>
-      <p:pic>
-        <p:nvPicPr>
-          <p:cNvPr id="4" name="Picture 3">
-            <a:extLst>
-              <a:ext uri="{FF2B5EF4-FFF2-40B4-BE49-F238E27FC236}">
-                <a16:creationId xmlns:a16="http://schemas.microsoft.com/office/drawing/2014/main" id="{B8FDFC63-863D-41B7-95AD-3A5778181DE3}"/>
-              </a:ext>
-            </a:extLst>
-          </p:cNvPr>
-          <p:cNvPicPr>
-            <a:picLocks noChangeAspect="1"/>
-          </p:cNvPicPr>
-          <p:nvPr/>
-        </p:nvPicPr>
-        <p:blipFill>
-          <a:blip r:embed="rId2"/>
-          <a:stretch>
-            <a:fillRect/>
-          </a:stretch>
-        </p:blipFill>
-        <p:spPr>
-          <a:xfrm>
-            <a:off x="3432991" y="4265174"/>
-            <a:ext cx="2663009" cy="225221"/>
-          </a:xfrm>
-          <a:prstGeom prst="rect">
-            <a:avLst/>
-          </a:prstGeom>
-        </p:spPr>
-      </p:pic>
-      <p:pic>
-        <p:nvPicPr>
-          <p:cNvPr id="5" name="Picture 4">
-            <a:extLst>
-              <a:ext uri="{FF2B5EF4-FFF2-40B4-BE49-F238E27FC236}">
-                <a16:creationId xmlns:a16="http://schemas.microsoft.com/office/drawing/2014/main" id="{204D9373-B403-475E-B6D4-EDE84FE3FD2F}"/>
-              </a:ext>
-            </a:extLst>
-          </p:cNvPr>
-          <p:cNvPicPr>
-            <a:picLocks noChangeAspect="1"/>
-          </p:cNvPicPr>
-          <p:nvPr/>
-        </p:nvPicPr>
-        <p:blipFill>
-          <a:blip r:embed="rId3"/>
-          <a:stretch>
-            <a:fillRect/>
-          </a:stretch>
-        </p:blipFill>
-        <p:spPr>
-          <a:xfrm>
-            <a:off x="3876343" y="4634818"/>
-            <a:ext cx="1158024" cy="263854"/>
-          </a:xfrm>
-          <a:prstGeom prst="rect">
-            <a:avLst/>
-          </a:prstGeom>
-        </p:spPr>
-      </p:pic>
-    </p:spTree>
-    <p:extLst>
-      <p:ext uri="{BB962C8B-B14F-4D97-AF65-F5344CB8AC3E}">
-        <p14:creationId xmlns:p14="http://schemas.microsoft.com/office/powerpoint/2010/main" val="102360009"/>
-      </p:ext>
-    </p:extLst>
-  </p:cSld>
-  <p:clrMapOvr>
-    <a:masterClrMapping/>
-  </p:clrMapOvr>
-</p:sld>
-</file>
-
 <file path=ppt/theme/theme1.xml><?xml version="1.0" encoding="utf-8"?>
 <a:theme xmlns:a="http://schemas.openxmlformats.org/drawingml/2006/main" name="Office Theme">
   <a:themeElements>

</xml_diff>